<commit_message>
Update Presentation Final Results
Updated Final Results Slide 9
Added Slide 10 for graphs
Added "Callback" to key Terms
Updated some formatting
</commit_message>
<xml_diff>
--- a/Final Presentation/MECH417_Team4_FinalPresentation.pptx
+++ b/Final Presentation/MECH417_Team4_FinalPresentation.pptx
@@ -13,14 +13,15 @@
     <p:sldId id="319" r:id="rId10"/>
     <p:sldId id="314" r:id="rId11"/>
     <p:sldId id="315" r:id="rId12"/>
-    <p:sldId id="327" r:id="rId13"/>
-    <p:sldId id="332" r:id="rId14"/>
-    <p:sldId id="316" r:id="rId15"/>
-    <p:sldId id="330" r:id="rId16"/>
-    <p:sldId id="331" r:id="rId17"/>
-    <p:sldId id="317" r:id="rId18"/>
-    <p:sldId id="328" r:id="rId19"/>
-    <p:sldId id="318" r:id="rId20"/>
+    <p:sldId id="333" r:id="rId13"/>
+    <p:sldId id="327" r:id="rId14"/>
+    <p:sldId id="332" r:id="rId15"/>
+    <p:sldId id="316" r:id="rId16"/>
+    <p:sldId id="330" r:id="rId17"/>
+    <p:sldId id="331" r:id="rId18"/>
+    <p:sldId id="317" r:id="rId19"/>
+    <p:sldId id="328" r:id="rId20"/>
+    <p:sldId id="318" r:id="rId21"/>
   </p:sldIdLst>
   <p:sldSz cx="12192000" cy="6858000"/>
   <p:notesSz cx="6858000" cy="9144000"/>
@@ -4675,40 +4676,7 @@
                   <a:srgbClr val="FF0000"/>
                 </a:solidFill>
               </a:rPr>
-              <a:t>Discuss final user manual outcome</a:t>
-            </a:r>
-          </a:p>
-          <a:p>
-            <a:pPr lvl="1"/>
-            <a:r>
-              <a:rPr lang="en-US" dirty="0">
-                <a:solidFill>
-                  <a:srgbClr val="FF0000"/>
-                </a:solidFill>
-              </a:rPr>
-              <a:t>List section: introduction, GUI section, function, etc.</a:t>
-            </a:r>
-          </a:p>
-          <a:p>
-            <a:pPr lvl="1"/>
-            <a:r>
-              <a:rPr lang="en-US" dirty="0">
-                <a:solidFill>
-                  <a:srgbClr val="FF0000"/>
-                </a:solidFill>
-              </a:rPr>
-              <a:t>For each section: describe what is covered in each section</a:t>
-            </a:r>
-          </a:p>
-          <a:p>
-            <a:pPr lvl="2"/>
-            <a:r>
-              <a:rPr lang="en-US" dirty="0">
-                <a:solidFill>
-                  <a:srgbClr val="FF0000"/>
-                </a:solidFill>
-              </a:rPr>
-              <a:t>Ex. GUI section: covers installation and features of the GUI on the user side</a:t>
+              <a:t>Show/Discuss graphs of data. </a:t>
             </a:r>
           </a:p>
         </p:txBody>
@@ -4716,7 +4684,7 @@
     </p:spTree>
     <p:extLst>
       <p:ext uri="{BB962C8B-B14F-4D97-AF65-F5344CB8AC3E}">
-        <p14:creationId xmlns:p14="http://schemas.microsoft.com/office/powerpoint/2010/main" val="726808292"/>
+        <p14:creationId xmlns:p14="http://schemas.microsoft.com/office/powerpoint/2010/main" val="3410302182"/>
       </p:ext>
     </p:extLst>
   </p:cSld>
@@ -4751,12 +4719,12 @@
           <a:chExt cx="0" cy="0"/>
         </a:xfrm>
       </p:grpSpPr>
-      <p:sp useBgFill="1">
-        <p:nvSpPr>
-          <p:cNvPr id="34" name="Rectangle 33">
+      <p:sp>
+        <p:nvSpPr>
+          <p:cNvPr id="25" name="Rectangle 24">
             <a:extLst>
               <a:ext uri="{FF2B5EF4-FFF2-40B4-BE49-F238E27FC236}">
-                <a16:creationId xmlns:a16="http://schemas.microsoft.com/office/drawing/2014/main" id="{54737801-B9D6-4A08-BD77-23010A80227A}"/>
+                <a16:creationId xmlns:a16="http://schemas.microsoft.com/office/drawing/2014/main" id="{47421797-7B77-498E-A01C-0A1194615BD5}"/>
               </a:ext>
               <a:ext uri="{C183D7F6-B498-43B3-948B-1728B52AA6E4}">
                 <adec:decorative xmlns:adec="http://schemas.microsoft.com/office/drawing/2017/decorative" val="1"/>
@@ -4777,11 +4745,14 @@
         <p:spPr>
           <a:xfrm>
             <a:off x="0" y="0"/>
-            <a:ext cx="12192000" cy="6858000"/>
+            <a:ext cx="12192001" cy="6858000"/>
           </a:xfrm>
           <a:prstGeom prst="rect">
             <a:avLst/>
           </a:prstGeom>
+          <a:solidFill>
+            <a:schemeClr val="bg1"/>
+          </a:solidFill>
           <a:ln>
             <a:noFill/>
           </a:ln>
@@ -4803,20 +4774,151 @@
           </a:fontRef>
         </p:style>
         <p:txBody>
-          <a:bodyPr rtlCol="0" anchor="ctr"/>
-          <a:lstStyle/>
+          <a:bodyPr rot="0" spcFirstLastPara="0" vert="horz" wrap="square" lIns="91440" tIns="45720" rIns="91440" bIns="45720" numCol="1" spcCol="0" rtlCol="0" fromWordArt="0" anchor="ctr" anchorCtr="0" forceAA="0" compatLnSpc="1">
+            <a:prstTxWarp prst="textNoShape">
+              <a:avLst/>
+            </a:prstTxWarp>
+            <a:noAutofit/>
+          </a:bodyPr>
+          <a:lstStyle>
+            <a:defPPr>
+              <a:defRPr lang="en-US"/>
+            </a:defPPr>
+            <a:lvl1pPr marL="0" algn="l" defTabSz="914400" rtl="0" eaLnBrk="1" latinLnBrk="0" hangingPunct="1">
+              <a:defRPr sz="1800" kern="1200">
+                <a:solidFill>
+                  <a:schemeClr val="lt1"/>
+                </a:solidFill>
+                <a:latin typeface="+mn-lt"/>
+                <a:ea typeface="+mn-ea"/>
+                <a:cs typeface="+mn-cs"/>
+              </a:defRPr>
+            </a:lvl1pPr>
+            <a:lvl2pPr marL="457200" algn="l" defTabSz="914400" rtl="0" eaLnBrk="1" latinLnBrk="0" hangingPunct="1">
+              <a:defRPr sz="1800" kern="1200">
+                <a:solidFill>
+                  <a:schemeClr val="lt1"/>
+                </a:solidFill>
+                <a:latin typeface="+mn-lt"/>
+                <a:ea typeface="+mn-ea"/>
+                <a:cs typeface="+mn-cs"/>
+              </a:defRPr>
+            </a:lvl2pPr>
+            <a:lvl3pPr marL="914400" algn="l" defTabSz="914400" rtl="0" eaLnBrk="1" latinLnBrk="0" hangingPunct="1">
+              <a:defRPr sz="1800" kern="1200">
+                <a:solidFill>
+                  <a:schemeClr val="lt1"/>
+                </a:solidFill>
+                <a:latin typeface="+mn-lt"/>
+                <a:ea typeface="+mn-ea"/>
+                <a:cs typeface="+mn-cs"/>
+              </a:defRPr>
+            </a:lvl3pPr>
+            <a:lvl4pPr marL="1371600" algn="l" defTabSz="914400" rtl="0" eaLnBrk="1" latinLnBrk="0" hangingPunct="1">
+              <a:defRPr sz="1800" kern="1200">
+                <a:solidFill>
+                  <a:schemeClr val="lt1"/>
+                </a:solidFill>
+                <a:latin typeface="+mn-lt"/>
+                <a:ea typeface="+mn-ea"/>
+                <a:cs typeface="+mn-cs"/>
+              </a:defRPr>
+            </a:lvl4pPr>
+            <a:lvl5pPr marL="1828800" algn="l" defTabSz="914400" rtl="0" eaLnBrk="1" latinLnBrk="0" hangingPunct="1">
+              <a:defRPr sz="1800" kern="1200">
+                <a:solidFill>
+                  <a:schemeClr val="lt1"/>
+                </a:solidFill>
+                <a:latin typeface="+mn-lt"/>
+                <a:ea typeface="+mn-ea"/>
+                <a:cs typeface="+mn-cs"/>
+              </a:defRPr>
+            </a:lvl5pPr>
+            <a:lvl6pPr marL="2286000" algn="l" defTabSz="914400" rtl="0" eaLnBrk="1" latinLnBrk="0" hangingPunct="1">
+              <a:defRPr sz="1800" kern="1200">
+                <a:solidFill>
+                  <a:schemeClr val="lt1"/>
+                </a:solidFill>
+                <a:latin typeface="+mn-lt"/>
+                <a:ea typeface="+mn-ea"/>
+                <a:cs typeface="+mn-cs"/>
+              </a:defRPr>
+            </a:lvl6pPr>
+            <a:lvl7pPr marL="2743200" algn="l" defTabSz="914400" rtl="0" eaLnBrk="1" latinLnBrk="0" hangingPunct="1">
+              <a:defRPr sz="1800" kern="1200">
+                <a:solidFill>
+                  <a:schemeClr val="lt1"/>
+                </a:solidFill>
+                <a:latin typeface="+mn-lt"/>
+                <a:ea typeface="+mn-ea"/>
+                <a:cs typeface="+mn-cs"/>
+              </a:defRPr>
+            </a:lvl7pPr>
+            <a:lvl8pPr marL="3200400" algn="l" defTabSz="914400" rtl="0" eaLnBrk="1" latinLnBrk="0" hangingPunct="1">
+              <a:defRPr sz="1800" kern="1200">
+                <a:solidFill>
+                  <a:schemeClr val="lt1"/>
+                </a:solidFill>
+                <a:latin typeface="+mn-lt"/>
+                <a:ea typeface="+mn-ea"/>
+                <a:cs typeface="+mn-cs"/>
+              </a:defRPr>
+            </a:lvl8pPr>
+            <a:lvl9pPr marL="3657600" algn="l" defTabSz="914400" rtl="0" eaLnBrk="1" latinLnBrk="0" hangingPunct="1">
+              <a:defRPr sz="1800" kern="1200">
+                <a:solidFill>
+                  <a:schemeClr val="lt1"/>
+                </a:solidFill>
+                <a:latin typeface="+mn-lt"/>
+                <a:ea typeface="+mn-ea"/>
+                <a:cs typeface="+mn-cs"/>
+              </a:defRPr>
+            </a:lvl9pPr>
+          </a:lstStyle>
           <a:p>
             <a:pPr algn="ctr"/>
             <a:endParaRPr lang="en-US"/>
           </a:p>
         </p:txBody>
       </p:sp>
-      <p:sp>
-        <p:nvSpPr>
-          <p:cNvPr id="36" name="Rectangle 35">
+      <p:pic>
+        <p:nvPicPr>
+          <p:cNvPr id="4" name="Picture 3">
             <a:extLst>
               <a:ext uri="{FF2B5EF4-FFF2-40B4-BE49-F238E27FC236}">
-                <a16:creationId xmlns:a16="http://schemas.microsoft.com/office/drawing/2014/main" id="{25FABD39-C757-461E-A681-DC273648402D}"/>
+                <a16:creationId xmlns:a16="http://schemas.microsoft.com/office/drawing/2014/main" id="{62BA1780-A246-4C7F-9267-727EF2F4E785}"/>
+              </a:ext>
+              <a:ext uri="{C183D7F6-B498-43B3-948B-1728B52AA6E4}">
+                <adec:decorative xmlns:adec="http://schemas.microsoft.com/office/drawing/2017/decorative" val="1"/>
+              </a:ext>
+            </a:extLst>
+          </p:cNvPr>
+          <p:cNvPicPr>
+            <a:picLocks noChangeAspect="1"/>
+          </p:cNvPicPr>
+          <p:nvPr/>
+        </p:nvPicPr>
+        <p:blipFill rotWithShape="1">
+          <a:blip r:embed="rId3"/>
+          <a:srcRect t="3846"/>
+          <a:stretch/>
+        </p:blipFill>
+        <p:spPr>
+          <a:xfrm>
+            <a:off x="20" y="10"/>
+            <a:ext cx="12191979" cy="6857990"/>
+          </a:xfrm>
+          <a:prstGeom prst="rect">
+            <a:avLst/>
+          </a:prstGeom>
+        </p:spPr>
+      </p:pic>
+      <p:sp>
+        <p:nvSpPr>
+          <p:cNvPr id="27" name="Rectangle 26">
+            <a:extLst>
+              <a:ext uri="{FF2B5EF4-FFF2-40B4-BE49-F238E27FC236}">
+                <a16:creationId xmlns:a16="http://schemas.microsoft.com/office/drawing/2014/main" id="{926D38EC-CD1B-456B-A813-64F8D8E71DA5}"/>
               </a:ext>
               <a:ext uri="{C183D7F6-B498-43B3-948B-1728B52AA6E4}">
                 <adec:decorative xmlns:adec="http://schemas.microsoft.com/office/drawing/2017/decorative" val="1"/>
@@ -4836,16 +4938,15 @@
         </p:nvSpPr>
         <p:spPr>
           <a:xfrm>
-            <a:off x="453190" y="572613"/>
-            <a:ext cx="11281609" cy="2396079"/>
+            <a:off x="234696" y="237744"/>
+            <a:ext cx="11722608" cy="6382512"/>
           </a:xfrm>
           <a:prstGeom prst="rect">
             <a:avLst/>
           </a:prstGeom>
           <a:solidFill>
-            <a:schemeClr val="tx1">
-              <a:lumMod val="85000"/>
-              <a:lumOff val="15000"/>
+            <a:schemeClr val="bg1">
+              <a:alpha val="90000"/>
             </a:schemeClr>
           </a:solidFill>
           <a:ln w="6350" cap="flat" cmpd="sng" algn="ctr">
@@ -4853,21 +4954,16 @@
             <a:prstDash val="solid"/>
           </a:ln>
           <a:effectLst>
-            <a:outerShdw blurRad="50800" algn="ctr" rotWithShape="0">
-              <a:prstClr val="black">
-                <a:alpha val="66000"/>
-              </a:prstClr>
-            </a:outerShdw>
             <a:softEdge rad="0"/>
           </a:effectLst>
         </p:spPr>
       </p:sp>
       <p:sp>
         <p:nvSpPr>
-          <p:cNvPr id="38" name="Rectangle 37">
+          <p:cNvPr id="29" name="Rectangle 28">
             <a:extLst>
               <a:ext uri="{FF2B5EF4-FFF2-40B4-BE49-F238E27FC236}">
-                <a16:creationId xmlns:a16="http://schemas.microsoft.com/office/drawing/2014/main" id="{2DF424F5-8D5C-46C0-A1B0-AF34E0350CD5}"/>
+                <a16:creationId xmlns:a16="http://schemas.microsoft.com/office/drawing/2014/main" id="{2DC18E46-CA2E-43A8-A2EC-61D30FAC3678}"/>
               </a:ext>
               <a:ext uri="{C183D7F6-B498-43B3-948B-1728B52AA6E4}">
                 <adec:decorative xmlns:adec="http://schemas.microsoft.com/office/drawing/2017/decorative" val="1"/>
@@ -4887,20 +4983,19 @@
         </p:nvSpPr>
         <p:spPr>
           <a:xfrm>
-            <a:off x="616738" y="737380"/>
-            <a:ext cx="10954512" cy="2066544"/>
+            <a:off x="371856" y="374904"/>
+            <a:ext cx="11448288" cy="6108192"/>
           </a:xfrm>
           <a:prstGeom prst="rect">
             <a:avLst/>
           </a:prstGeom>
-          <a:solidFill>
-            <a:schemeClr val="tx1">
-              <a:lumMod val="95000"/>
-            </a:schemeClr>
-          </a:solidFill>
+          <a:noFill/>
           <a:ln w="6350" cap="sq" cmpd="sng" algn="ctr">
             <a:solidFill>
-              <a:schemeClr val="bg1"/>
+              <a:schemeClr val="tx1">
+                <a:lumMod val="75000"/>
+                <a:lumOff val="25000"/>
+              </a:schemeClr>
             </a:solidFill>
             <a:prstDash val="solid"/>
             <a:miter lim="800000"/>
@@ -4926,7 +5021,7 @@
         </p:nvSpPr>
         <p:spPr>
           <a:xfrm>
-            <a:off x="1066800" y="1089090"/>
+            <a:off x="1066800" y="642594"/>
             <a:ext cx="10058400" cy="1371600"/>
           </a:xfrm>
         </p:spPr>
@@ -4936,14 +5031,9 @@
           </a:bodyPr>
           <a:lstStyle/>
           <a:p>
-            <a:pPr algn="ctr"/>
-            <a:r>
-              <a:rPr lang="en-US">
-                <a:solidFill>
-                  <a:schemeClr val="bg1"/>
-                </a:solidFill>
-              </a:rPr>
-              <a:t>Conclusion</a:t>
+            <a:r>
+              <a:rPr lang="en-US" dirty="0"/>
+              <a:t>Final Results</a:t>
             </a:r>
           </a:p>
         </p:txBody>
@@ -4966,64 +5056,56 @@
         </p:nvSpPr>
         <p:spPr>
           <a:xfrm>
-            <a:off x="1066800" y="3429000"/>
-            <a:ext cx="10058400" cy="2508384"/>
+            <a:off x="1066800" y="2103120"/>
+            <a:ext cx="10058400" cy="3849624"/>
           </a:xfrm>
         </p:spPr>
         <p:txBody>
-          <a:bodyPr anchor="t">
+          <a:bodyPr>
             <a:normAutofit/>
           </a:bodyPr>
           <a:lstStyle/>
           <a:p>
             <a:r>
-              <a:rPr lang="en-US" sz="2000" dirty="0">
+              <a:rPr lang="en-US" dirty="0">
                 <a:solidFill>
                   <a:srgbClr val="FF0000"/>
                 </a:solidFill>
               </a:rPr>
-              <a:t>Discuss skills gained</a:t>
-            </a:r>
-          </a:p>
-          <a:p>
-            <a:r>
-              <a:rPr lang="en-US" sz="2000" dirty="0">
+              <a:t>Discuss final user manual outcome</a:t>
+            </a:r>
+          </a:p>
+          <a:p>
+            <a:pPr lvl="1"/>
+            <a:r>
+              <a:rPr lang="en-US" dirty="0">
                 <a:solidFill>
                   <a:srgbClr val="FF0000"/>
                 </a:solidFill>
               </a:rPr>
-              <a:t>Address the equation generation/simulations</a:t>
+              <a:t>List section: introduction, GUI section, function, etc.</a:t>
             </a:r>
           </a:p>
           <a:p>
             <a:pPr lvl="1"/>
             <a:r>
-              <a:rPr lang="en-US" sz="1800" dirty="0">
+              <a:rPr lang="en-US" dirty="0">
                 <a:solidFill>
                   <a:srgbClr val="FF0000"/>
                 </a:solidFill>
               </a:rPr>
-              <a:t>How we could have planned better to include this</a:t>
-            </a:r>
-          </a:p>
-          <a:p>
-            <a:r>
-              <a:rPr lang="en-US" sz="2000" dirty="0">
+              <a:t>For each section: describe what is covered in each section</a:t>
+            </a:r>
+          </a:p>
+          <a:p>
+            <a:pPr lvl="2"/>
+            <a:r>
+              <a:rPr lang="en-US" dirty="0">
                 <a:solidFill>
                   <a:srgbClr val="FF0000"/>
                 </a:solidFill>
               </a:rPr>
-              <a:t>Discuss applet limitations/bugs</a:t>
-            </a:r>
-          </a:p>
-          <a:p>
-            <a:r>
-              <a:rPr lang="en-US" sz="2000" dirty="0">
-                <a:solidFill>
-                  <a:srgbClr val="FF0000"/>
-                </a:solidFill>
-              </a:rPr>
-              <a:t>Discuss a final comparison of the competitor</a:t>
+              <a:t>Ex. GUI section: covers installation and features of the GUI on the user side</a:t>
             </a:r>
           </a:p>
         </p:txBody>
@@ -5031,7 +5113,7 @@
     </p:spTree>
     <p:extLst>
       <p:ext uri="{BB962C8B-B14F-4D97-AF65-F5344CB8AC3E}">
-        <p14:creationId xmlns:p14="http://schemas.microsoft.com/office/powerpoint/2010/main" val="2600328208"/>
+        <p14:creationId xmlns:p14="http://schemas.microsoft.com/office/powerpoint/2010/main" val="726808292"/>
       </p:ext>
     </p:extLst>
   </p:cSld>
@@ -5253,6 +5335,321 @@
           <a:p>
             <a:pPr algn="ctr"/>
             <a:r>
+              <a:rPr lang="en-US">
+                <a:solidFill>
+                  <a:schemeClr val="bg1"/>
+                </a:solidFill>
+              </a:rPr>
+              <a:t>Conclusion</a:t>
+            </a:r>
+          </a:p>
+        </p:txBody>
+      </p:sp>
+      <p:sp>
+        <p:nvSpPr>
+          <p:cNvPr id="3" name="Subtitle 2">
+            <a:extLst>
+              <a:ext uri="{FF2B5EF4-FFF2-40B4-BE49-F238E27FC236}">
+                <a16:creationId xmlns:a16="http://schemas.microsoft.com/office/drawing/2014/main" id="{5C5BFB45-FC34-495C-9C68-F9641246C2EE}"/>
+              </a:ext>
+            </a:extLst>
+          </p:cNvPr>
+          <p:cNvSpPr>
+            <a:spLocks noGrp="1"/>
+          </p:cNvSpPr>
+          <p:nvPr>
+            <p:ph idx="1"/>
+          </p:nvPr>
+        </p:nvSpPr>
+        <p:spPr>
+          <a:xfrm>
+            <a:off x="1066800" y="3429000"/>
+            <a:ext cx="10058400" cy="2508384"/>
+          </a:xfrm>
+        </p:spPr>
+        <p:txBody>
+          <a:bodyPr anchor="t">
+            <a:normAutofit/>
+          </a:bodyPr>
+          <a:lstStyle/>
+          <a:p>
+            <a:r>
+              <a:rPr lang="en-US" sz="2000" dirty="0">
+                <a:solidFill>
+                  <a:srgbClr val="FF0000"/>
+                </a:solidFill>
+              </a:rPr>
+              <a:t>Discuss skills gained</a:t>
+            </a:r>
+          </a:p>
+          <a:p>
+            <a:r>
+              <a:rPr lang="en-US" sz="2000" dirty="0">
+                <a:solidFill>
+                  <a:srgbClr val="FF0000"/>
+                </a:solidFill>
+              </a:rPr>
+              <a:t>Address the equation generation/simulations</a:t>
+            </a:r>
+          </a:p>
+          <a:p>
+            <a:pPr lvl="1"/>
+            <a:r>
+              <a:rPr lang="en-US" sz="1800" dirty="0">
+                <a:solidFill>
+                  <a:srgbClr val="FF0000"/>
+                </a:solidFill>
+              </a:rPr>
+              <a:t>How we could have planned better to include this</a:t>
+            </a:r>
+          </a:p>
+          <a:p>
+            <a:r>
+              <a:rPr lang="en-US" sz="2000" dirty="0">
+                <a:solidFill>
+                  <a:srgbClr val="FF0000"/>
+                </a:solidFill>
+              </a:rPr>
+              <a:t>Discuss applet limitations/bugs</a:t>
+            </a:r>
+          </a:p>
+          <a:p>
+            <a:r>
+              <a:rPr lang="en-US" sz="2000" dirty="0">
+                <a:solidFill>
+                  <a:srgbClr val="FF0000"/>
+                </a:solidFill>
+              </a:rPr>
+              <a:t>Discuss a final comparison of the competitor</a:t>
+            </a:r>
+          </a:p>
+        </p:txBody>
+      </p:sp>
+    </p:spTree>
+    <p:extLst>
+      <p:ext uri="{BB962C8B-B14F-4D97-AF65-F5344CB8AC3E}">
+        <p14:creationId xmlns:p14="http://schemas.microsoft.com/office/powerpoint/2010/main" val="2600328208"/>
+      </p:ext>
+    </p:extLst>
+  </p:cSld>
+  <p:clrMapOvr>
+    <a:overrideClrMapping bg1="dk1" tx1="lt1" bg2="dk2" tx2="lt2" accent1="accent1" accent2="accent2" accent3="accent3" accent4="accent4" accent5="accent5" accent6="accent6" hlink="hlink" folHlink="folHlink"/>
+  </p:clrMapOvr>
+</p:sld>
+</file>
+
+<file path=ppt/slides/slide13.xml><?xml version="1.0" encoding="utf-8"?>
+<p:sld xmlns:a="http://schemas.openxmlformats.org/drawingml/2006/main" xmlns:r="http://schemas.openxmlformats.org/officeDocument/2006/relationships" xmlns:p="http://schemas.openxmlformats.org/presentationml/2006/main">
+  <p:cSld>
+    <p:bg>
+      <p:bgPr>
+        <a:solidFill>
+          <a:schemeClr val="bg1"/>
+        </a:solidFill>
+        <a:effectLst/>
+      </p:bgPr>
+    </p:bg>
+    <p:spTree>
+      <p:nvGrpSpPr>
+        <p:cNvPr id="1" name=""/>
+        <p:cNvGrpSpPr/>
+        <p:nvPr/>
+      </p:nvGrpSpPr>
+      <p:grpSpPr>
+        <a:xfrm>
+          <a:off x="0" y="0"/>
+          <a:ext cx="0" cy="0"/>
+          <a:chOff x="0" y="0"/>
+          <a:chExt cx="0" cy="0"/>
+        </a:xfrm>
+      </p:grpSpPr>
+      <p:sp useBgFill="1">
+        <p:nvSpPr>
+          <p:cNvPr id="34" name="Rectangle 33">
+            <a:extLst>
+              <a:ext uri="{FF2B5EF4-FFF2-40B4-BE49-F238E27FC236}">
+                <a16:creationId xmlns:a16="http://schemas.microsoft.com/office/drawing/2014/main" id="{54737801-B9D6-4A08-BD77-23010A80227A}"/>
+              </a:ext>
+              <a:ext uri="{C183D7F6-B498-43B3-948B-1728B52AA6E4}">
+                <adec:decorative xmlns:adec="http://schemas.microsoft.com/office/drawing/2017/decorative" val="1"/>
+              </a:ext>
+            </a:extLst>
+          </p:cNvPr>
+          <p:cNvSpPr>
+            <a:spLocks noGrp="1" noRot="1" noChangeAspect="1" noMove="1" noResize="1" noEditPoints="1" noAdjustHandles="1" noChangeArrowheads="1" noChangeShapeType="1" noTextEdit="1"/>
+          </p:cNvSpPr>
+          <p:nvPr>
+            <p:extLst>
+              <p:ext uri="{386F3935-93C4-4BCD-93E2-E3B085C9AB24}">
+                <p16:designElem xmlns:p16="http://schemas.microsoft.com/office/powerpoint/2015/main" val="1"/>
+              </p:ext>
+            </p:extLst>
+          </p:nvPr>
+        </p:nvSpPr>
+        <p:spPr>
+          <a:xfrm>
+            <a:off x="0" y="0"/>
+            <a:ext cx="12192000" cy="6858000"/>
+          </a:xfrm>
+          <a:prstGeom prst="rect">
+            <a:avLst/>
+          </a:prstGeom>
+          <a:ln>
+            <a:noFill/>
+          </a:ln>
+        </p:spPr>
+        <p:style>
+          <a:lnRef idx="2">
+            <a:schemeClr val="accent1">
+              <a:shade val="50000"/>
+            </a:schemeClr>
+          </a:lnRef>
+          <a:fillRef idx="1">
+            <a:schemeClr val="accent1"/>
+          </a:fillRef>
+          <a:effectRef idx="0">
+            <a:schemeClr val="accent1"/>
+          </a:effectRef>
+          <a:fontRef idx="minor">
+            <a:schemeClr val="lt1"/>
+          </a:fontRef>
+        </p:style>
+        <p:txBody>
+          <a:bodyPr rtlCol="0" anchor="ctr"/>
+          <a:lstStyle/>
+          <a:p>
+            <a:pPr algn="ctr"/>
+            <a:endParaRPr lang="en-US"/>
+          </a:p>
+        </p:txBody>
+      </p:sp>
+      <p:sp>
+        <p:nvSpPr>
+          <p:cNvPr id="36" name="Rectangle 35">
+            <a:extLst>
+              <a:ext uri="{FF2B5EF4-FFF2-40B4-BE49-F238E27FC236}">
+                <a16:creationId xmlns:a16="http://schemas.microsoft.com/office/drawing/2014/main" id="{25FABD39-C757-461E-A681-DC273648402D}"/>
+              </a:ext>
+              <a:ext uri="{C183D7F6-B498-43B3-948B-1728B52AA6E4}">
+                <adec:decorative xmlns:adec="http://schemas.microsoft.com/office/drawing/2017/decorative" val="1"/>
+              </a:ext>
+            </a:extLst>
+          </p:cNvPr>
+          <p:cNvSpPr>
+            <a:spLocks noGrp="1" noRot="1" noChangeAspect="1" noMove="1" noResize="1" noEditPoints="1" noAdjustHandles="1" noChangeArrowheads="1" noChangeShapeType="1" noTextEdit="1"/>
+          </p:cNvSpPr>
+          <p:nvPr>
+            <p:extLst>
+              <p:ext uri="{386F3935-93C4-4BCD-93E2-E3B085C9AB24}">
+                <p16:designElem xmlns:p16="http://schemas.microsoft.com/office/powerpoint/2015/main" val="1"/>
+              </p:ext>
+            </p:extLst>
+          </p:nvPr>
+        </p:nvSpPr>
+        <p:spPr>
+          <a:xfrm>
+            <a:off x="453190" y="572613"/>
+            <a:ext cx="11281609" cy="2396079"/>
+          </a:xfrm>
+          <a:prstGeom prst="rect">
+            <a:avLst/>
+          </a:prstGeom>
+          <a:solidFill>
+            <a:schemeClr val="tx1">
+              <a:lumMod val="85000"/>
+              <a:lumOff val="15000"/>
+            </a:schemeClr>
+          </a:solidFill>
+          <a:ln w="6350" cap="flat" cmpd="sng" algn="ctr">
+            <a:noFill/>
+            <a:prstDash val="solid"/>
+          </a:ln>
+          <a:effectLst>
+            <a:outerShdw blurRad="50800" algn="ctr" rotWithShape="0">
+              <a:prstClr val="black">
+                <a:alpha val="66000"/>
+              </a:prstClr>
+            </a:outerShdw>
+            <a:softEdge rad="0"/>
+          </a:effectLst>
+        </p:spPr>
+      </p:sp>
+      <p:sp>
+        <p:nvSpPr>
+          <p:cNvPr id="38" name="Rectangle 37">
+            <a:extLst>
+              <a:ext uri="{FF2B5EF4-FFF2-40B4-BE49-F238E27FC236}">
+                <a16:creationId xmlns:a16="http://schemas.microsoft.com/office/drawing/2014/main" id="{2DF424F5-8D5C-46C0-A1B0-AF34E0350CD5}"/>
+              </a:ext>
+              <a:ext uri="{C183D7F6-B498-43B3-948B-1728B52AA6E4}">
+                <adec:decorative xmlns:adec="http://schemas.microsoft.com/office/drawing/2017/decorative" val="1"/>
+              </a:ext>
+            </a:extLst>
+          </p:cNvPr>
+          <p:cNvSpPr>
+            <a:spLocks noGrp="1" noRot="1" noChangeAspect="1" noMove="1" noResize="1" noEditPoints="1" noAdjustHandles="1" noChangeArrowheads="1" noChangeShapeType="1" noTextEdit="1"/>
+          </p:cNvSpPr>
+          <p:nvPr>
+            <p:extLst>
+              <p:ext uri="{386F3935-93C4-4BCD-93E2-E3B085C9AB24}">
+                <p16:designElem xmlns:p16="http://schemas.microsoft.com/office/powerpoint/2015/main" val="1"/>
+              </p:ext>
+            </p:extLst>
+          </p:nvPr>
+        </p:nvSpPr>
+        <p:spPr>
+          <a:xfrm>
+            <a:off x="616738" y="737380"/>
+            <a:ext cx="10954512" cy="2066544"/>
+          </a:xfrm>
+          <a:prstGeom prst="rect">
+            <a:avLst/>
+          </a:prstGeom>
+          <a:solidFill>
+            <a:schemeClr val="tx1">
+              <a:lumMod val="95000"/>
+            </a:schemeClr>
+          </a:solidFill>
+          <a:ln w="6350" cap="sq" cmpd="sng" algn="ctr">
+            <a:solidFill>
+              <a:schemeClr val="bg1"/>
+            </a:solidFill>
+            <a:prstDash val="solid"/>
+            <a:miter lim="800000"/>
+          </a:ln>
+          <a:effectLst/>
+        </p:spPr>
+      </p:sp>
+      <p:sp>
+        <p:nvSpPr>
+          <p:cNvPr id="2" name="Title 1">
+            <a:extLst>
+              <a:ext uri="{FF2B5EF4-FFF2-40B4-BE49-F238E27FC236}">
+                <a16:creationId xmlns:a16="http://schemas.microsoft.com/office/drawing/2014/main" id="{C0D7398C-75E5-4CB0-BA4F-D7D5CF2495D4}"/>
+              </a:ext>
+            </a:extLst>
+          </p:cNvPr>
+          <p:cNvSpPr>
+            <a:spLocks noGrp="1"/>
+          </p:cNvSpPr>
+          <p:nvPr>
+            <p:ph type="title"/>
+          </p:nvPr>
+        </p:nvSpPr>
+        <p:spPr>
+          <a:xfrm>
+            <a:off x="1066800" y="1089090"/>
+            <a:ext cx="10058400" cy="1371600"/>
+          </a:xfrm>
+        </p:spPr>
+        <p:txBody>
+          <a:bodyPr>
+            <a:normAutofit/>
+          </a:bodyPr>
+          <a:lstStyle/>
+          <a:p>
+            <a:pPr algn="ctr"/>
+            <a:r>
               <a:rPr lang="en-US" dirty="0">
                 <a:solidFill>
                   <a:schemeClr val="bg1"/>
@@ -5359,7 +5756,7 @@
 </p:sld>
 </file>
 
-<file path=ppt/slides/slide13.xml><?xml version="1.0" encoding="utf-8"?>
+<file path=ppt/slides/slide14.xml><?xml version="1.0" encoding="utf-8"?>
 <p:sld xmlns:a="http://schemas.openxmlformats.org/drawingml/2006/main" xmlns:r="http://schemas.openxmlformats.org/officeDocument/2006/relationships" xmlns:p="http://schemas.openxmlformats.org/presentationml/2006/main">
   <p:cSld>
     <p:spTree>
@@ -5464,7 +5861,7 @@
 </p:sld>
 </file>
 
-<file path=ppt/slides/slide14.xml><?xml version="1.0" encoding="utf-8"?>
+<file path=ppt/slides/slide15.xml><?xml version="1.0" encoding="utf-8"?>
 <p:sld xmlns:a="http://schemas.openxmlformats.org/drawingml/2006/main" xmlns:r="http://schemas.openxmlformats.org/officeDocument/2006/relationships" xmlns:p="http://schemas.openxmlformats.org/presentationml/2006/main">
   <p:cSld>
     <p:bg>
@@ -6138,7 +6535,7 @@
 </p:sld>
 </file>
 
-<file path=ppt/slides/slide15.xml><?xml version="1.0" encoding="utf-8"?>
+<file path=ppt/slides/slide16.xml><?xml version="1.0" encoding="utf-8"?>
 <p:sld xmlns:a="http://schemas.openxmlformats.org/drawingml/2006/main" xmlns:r="http://schemas.openxmlformats.org/officeDocument/2006/relationships" xmlns:p="http://schemas.openxmlformats.org/presentationml/2006/main">
   <p:cSld>
     <p:bg>
@@ -6791,7 +7188,7 @@
 </p:sld>
 </file>
 
-<file path=ppt/slides/slide16.xml><?xml version="1.0" encoding="utf-8"?>
+<file path=ppt/slides/slide17.xml><?xml version="1.0" encoding="utf-8"?>
 <p:sld xmlns:a="http://schemas.openxmlformats.org/drawingml/2006/main" xmlns:r="http://schemas.openxmlformats.org/officeDocument/2006/relationships" xmlns:p="http://schemas.openxmlformats.org/presentationml/2006/main">
   <p:cSld>
     <p:bg>
@@ -7811,7 +8208,7 @@
         </p:spPr>
         <p:txBody>
           <a:bodyPr>
-            <a:normAutofit/>
+            <a:normAutofit lnSpcReduction="10000"/>
           </a:bodyPr>
           <a:lstStyle/>
           <a:p>
@@ -7823,7 +8220,7 @@
           <a:p>
             <a:r>
               <a:rPr lang="en-US" dirty="0"/>
-              <a:t>Applet – a small application for performing one or a few simple functions</a:t>
+              <a:t>Applet – A small application for performing one or a few simple functions</a:t>
             </a:r>
           </a:p>
           <a:p>
@@ -7835,7 +8232,13 @@
           <a:p>
             <a:r>
               <a:rPr lang="en-US" dirty="0"/>
-              <a:t>Spread Radius – the contact radius of a droplet</a:t>
+              <a:t>Spread Radius – The contact radius of a droplet</a:t>
+            </a:r>
+          </a:p>
+          <a:p>
+            <a:r>
+              <a:rPr lang="en-US" dirty="0"/>
+              <a:t>Callback – A function that is activated by user input </a:t>
             </a:r>
           </a:p>
         </p:txBody>
@@ -10280,8 +10683,37 @@
             </a:lvl9pPr>
           </a:lstStyle>
           <a:p>
-            <a:pPr algn="ctr"/>
-            <a:endParaRPr lang="en-US"/>
+            <a:pPr marL="0" marR="0" lvl="0" indent="0" algn="ctr" defTabSz="914400" rtl="0" eaLnBrk="1" fontAlgn="auto" latinLnBrk="0" hangingPunct="1">
+              <a:lnSpc>
+                <a:spcPct val="100000"/>
+              </a:lnSpc>
+              <a:spcBef>
+                <a:spcPts val="0"/>
+              </a:spcBef>
+              <a:spcAft>
+                <a:spcPts val="0"/>
+              </a:spcAft>
+              <a:buClrTx/>
+              <a:buSzTx/>
+              <a:buFontTx/>
+              <a:buNone/>
+              <a:tabLst/>
+              <a:defRPr/>
+            </a:pPr>
+            <a:endParaRPr kumimoji="0" lang="en-US" sz="1800" b="0" i="0" u="none" strike="noStrike" kern="1200" cap="none" spc="0" normalizeH="0" baseline="0" noProof="0">
+              <a:ln>
+                <a:noFill/>
+              </a:ln>
+              <a:solidFill>
+                <a:prstClr val="white"/>
+              </a:solidFill>
+              <a:effectLst/>
+              <a:uLnTx/>
+              <a:uFillTx/>
+              <a:latin typeface="Sagona Book" panose="02020404030301010803"/>
+              <a:ea typeface="+mn-ea"/>
+              <a:cs typeface="+mn-cs"/>
+            </a:endParaRPr>
           </a:p>
         </p:txBody>
       </p:sp>
@@ -10460,33 +10892,277 @@
         </p:nvSpPr>
         <p:spPr>
           <a:xfrm>
-            <a:off x="1066800" y="2103120"/>
-            <a:ext cx="10058400" cy="3849624"/>
+            <a:off x="1066800" y="1873250"/>
+            <a:ext cx="10058400" cy="4193530"/>
           </a:xfrm>
         </p:spPr>
         <p:txBody>
           <a:bodyPr>
-            <a:normAutofit/>
+            <a:normAutofit fontScale="92500" lnSpcReduction="20000"/>
           </a:bodyPr>
           <a:lstStyle/>
           <a:p>
             <a:r>
               <a:rPr lang="en-US" dirty="0">
                 <a:solidFill>
-                  <a:srgbClr val="FF0000"/>
-                </a:solidFill>
-              </a:rPr>
-              <a:t>Discuss final GUI outcome</a:t>
-            </a:r>
-          </a:p>
-          <a:p>
+                  <a:schemeClr val="tx1">
+                    <a:lumMod val="85000"/>
+                    <a:lumOff val="15000"/>
+                  </a:schemeClr>
+                </a:solidFill>
+              </a:rPr>
+              <a:t>GUI Input Parameters:</a:t>
+            </a:r>
+          </a:p>
+          <a:p>
+            <a:pPr lvl="1"/>
             <a:r>
               <a:rPr lang="en-US" dirty="0">
                 <a:solidFill>
-                  <a:srgbClr val="FF0000"/>
-                </a:solidFill>
-              </a:rPr>
-              <a:t>Show/Discuss graphs of data</a:t>
+                  <a:schemeClr val="tx1">
+                    <a:lumMod val="85000"/>
+                    <a:lumOff val="15000"/>
+                  </a:schemeClr>
+                </a:solidFill>
+              </a:rPr>
+              <a:t>Video Upload</a:t>
+            </a:r>
+          </a:p>
+          <a:p>
+            <a:pPr lvl="1"/>
+            <a:r>
+              <a:rPr lang="en-US" dirty="0">
+                <a:solidFill>
+                  <a:schemeClr val="tx1">
+                    <a:lumMod val="85000"/>
+                    <a:lumOff val="15000"/>
+                  </a:schemeClr>
+                </a:solidFill>
+              </a:rPr>
+              <a:t>Floor Height</a:t>
+            </a:r>
+          </a:p>
+          <a:p>
+            <a:pPr lvl="1"/>
+            <a:r>
+              <a:rPr lang="en-US" dirty="0">
+                <a:solidFill>
+                  <a:schemeClr val="tx1">
+                    <a:lumMod val="85000"/>
+                    <a:lumOff val="15000"/>
+                  </a:schemeClr>
+                </a:solidFill>
+              </a:rPr>
+              <a:t>Floor Angle</a:t>
+            </a:r>
+          </a:p>
+          <a:p>
+            <a:pPr lvl="1"/>
+            <a:r>
+              <a:rPr lang="en-US" dirty="0">
+                <a:solidFill>
+                  <a:schemeClr val="tx1">
+                    <a:lumMod val="85000"/>
+                    <a:lumOff val="15000"/>
+                  </a:schemeClr>
+                </a:solidFill>
+              </a:rPr>
+              <a:t>Unit conversions</a:t>
+            </a:r>
+          </a:p>
+          <a:p>
+            <a:pPr lvl="2"/>
+            <a:r>
+              <a:rPr lang="en-US" dirty="0">
+                <a:solidFill>
+                  <a:schemeClr val="tx1">
+                    <a:lumMod val="85000"/>
+                    <a:lumOff val="15000"/>
+                  </a:schemeClr>
+                </a:solidFill>
+              </a:rPr>
+              <a:t>Change from pixels/frame  to Microns/Second</a:t>
+            </a:r>
+          </a:p>
+          <a:p>
+            <a:r>
+              <a:rPr lang="en-US" dirty="0">
+                <a:solidFill>
+                  <a:schemeClr val="tx1">
+                    <a:lumMod val="85000"/>
+                    <a:lumOff val="15000"/>
+                  </a:schemeClr>
+                </a:solidFill>
+              </a:rPr>
+              <a:t>GUI Outputs/Features:</a:t>
+            </a:r>
+          </a:p>
+          <a:p>
+            <a:pPr lvl="1"/>
+            <a:r>
+              <a:rPr lang="en-US" dirty="0">
+                <a:solidFill>
+                  <a:schemeClr val="tx1">
+                    <a:lumMod val="85000"/>
+                    <a:lumOff val="15000"/>
+                  </a:schemeClr>
+                </a:solidFill>
+              </a:rPr>
+              <a:t>Processed images showing droplet boundary or contact angles</a:t>
+            </a:r>
+          </a:p>
+          <a:p>
+            <a:pPr lvl="2"/>
+            <a:r>
+              <a:rPr lang="en-US" dirty="0">
+                <a:solidFill>
+                  <a:schemeClr val="tx1">
+                    <a:lumMod val="85000"/>
+                    <a:lumOff val="15000"/>
+                  </a:schemeClr>
+                </a:solidFill>
+              </a:rPr>
+              <a:t>Four outline colors</a:t>
+            </a:r>
+          </a:p>
+          <a:p>
+            <a:pPr lvl="2"/>
+            <a:r>
+              <a:rPr lang="en-US" dirty="0">
+                <a:solidFill>
+                  <a:schemeClr val="tx1">
+                    <a:lumMod val="85000"/>
+                    <a:lumOff val="15000"/>
+                  </a:schemeClr>
+                </a:solidFill>
+              </a:rPr>
+              <a:t>Optimized: Decreased postprocessing time by  75%</a:t>
+            </a:r>
+          </a:p>
+          <a:p>
+            <a:pPr lvl="1"/>
+            <a:r>
+              <a:rPr lang="en-US" dirty="0">
+                <a:solidFill>
+                  <a:schemeClr val="tx1">
+                    <a:lumMod val="85000"/>
+                    <a:lumOff val="15000"/>
+                  </a:schemeClr>
+                </a:solidFill>
+              </a:rPr>
+              <a:t>Slider to  view all frames</a:t>
+            </a:r>
+          </a:p>
+          <a:p>
+            <a:pPr lvl="1"/>
+            <a:r>
+              <a:rPr lang="en-US" dirty="0">
+                <a:solidFill>
+                  <a:schemeClr val="tx1">
+                    <a:lumMod val="85000"/>
+                    <a:lumOff val="15000"/>
+                  </a:schemeClr>
+                </a:solidFill>
+              </a:rPr>
+              <a:t>Save current frame</a:t>
+            </a:r>
+          </a:p>
+          <a:p>
+            <a:pPr lvl="2"/>
+            <a:r>
+              <a:rPr lang="en-US" dirty="0">
+                <a:solidFill>
+                  <a:schemeClr val="tx1">
+                    <a:lumMod val="85000"/>
+                    <a:lumOff val="15000"/>
+                  </a:schemeClr>
+                </a:solidFill>
+              </a:rPr>
+              <a:t>Saves current processed frame as an image into a designated folder</a:t>
+            </a:r>
+          </a:p>
+          <a:p>
+            <a:pPr lvl="1"/>
+            <a:r>
+              <a:rPr lang="en-US" dirty="0">
+                <a:solidFill>
+                  <a:schemeClr val="tx1">
+                    <a:lumMod val="85000"/>
+                    <a:lumOff val="15000"/>
+                  </a:schemeClr>
+                </a:solidFill>
+              </a:rPr>
+              <a:t>Save processed video</a:t>
+            </a:r>
+          </a:p>
+          <a:p>
+            <a:pPr lvl="2"/>
+            <a:r>
+              <a:rPr lang="en-US" dirty="0">
+                <a:solidFill>
+                  <a:schemeClr val="tx1">
+                    <a:lumMod val="85000"/>
+                    <a:lumOff val="15000"/>
+                  </a:schemeClr>
+                </a:solidFill>
+              </a:rPr>
+              <a:t>Saves processed video as a .AVI into a designated folder</a:t>
+            </a:r>
+          </a:p>
+          <a:p>
+            <a:pPr lvl="1"/>
+            <a:r>
+              <a:rPr lang="en-US" dirty="0">
+                <a:solidFill>
+                  <a:schemeClr val="tx1">
+                    <a:lumMod val="85000"/>
+                    <a:lumOff val="15000"/>
+                  </a:schemeClr>
+                </a:solidFill>
+              </a:rPr>
+              <a:t>Save Analytics</a:t>
+            </a:r>
+          </a:p>
+          <a:p>
+            <a:pPr lvl="2"/>
+            <a:r>
+              <a:rPr lang="en-US" dirty="0">
+                <a:solidFill>
+                  <a:schemeClr val="tx1">
+                    <a:lumMod val="85000"/>
+                    <a:lumOff val="15000"/>
+                  </a:schemeClr>
+                </a:solidFill>
+              </a:rPr>
+              <a:t>Saves  processed data as a table to a .csv  file</a:t>
+            </a:r>
+          </a:p>
+          <a:p>
+            <a:pPr lvl="1"/>
+            <a:r>
+              <a:rPr lang="en-US" dirty="0">
+                <a:solidFill>
+                  <a:schemeClr val="tx1">
+                    <a:lumMod val="85000"/>
+                    <a:lumOff val="15000"/>
+                  </a:schemeClr>
+                </a:solidFill>
+              </a:rPr>
+              <a:t>Display of various output parameters</a:t>
+            </a:r>
+          </a:p>
+          <a:p>
+            <a:pPr lvl="1"/>
+            <a:r>
+              <a:rPr lang="en-US" dirty="0">
+                <a:solidFill>
+                  <a:schemeClr val="tx1">
+                    <a:lumMod val="85000"/>
+                    <a:lumOff val="15000"/>
+                  </a:schemeClr>
+                </a:solidFill>
+              </a:rPr>
+              <a:t>Output parameter unit conversions</a:t>
             </a:r>
           </a:p>
         </p:txBody>
@@ -10513,7 +11189,7 @@
         </p:blipFill>
         <p:spPr>
           <a:xfrm>
-            <a:off x="8028950" y="2139696"/>
+            <a:off x="7254250" y="1485646"/>
             <a:ext cx="3791194" cy="4343400"/>
           </a:xfrm>
           <a:prstGeom prst="rect">
@@ -10524,7 +11200,7 @@
     </p:spTree>
     <p:extLst>
       <p:ext uri="{BB962C8B-B14F-4D97-AF65-F5344CB8AC3E}">
-        <p14:creationId xmlns:p14="http://schemas.microsoft.com/office/powerpoint/2010/main" val="3410302182"/>
+        <p14:creationId xmlns:p14="http://schemas.microsoft.com/office/powerpoint/2010/main" val="372158832"/>
       </p:ext>
     </p:extLst>
   </p:cSld>
@@ -11111,6 +11787,49 @@
 </a:themeOverride>
 </file>
 
+<file path=ppt/theme/themeOverride16.xml><?xml version="1.0" encoding="utf-8"?>
+<a:themeOverride xmlns:a="http://schemas.openxmlformats.org/drawingml/2006/main">
+  <a:clrScheme name="Marquee">
+    <a:dk1>
+      <a:srgbClr val="000000"/>
+    </a:dk1>
+    <a:lt1>
+      <a:sysClr val="window" lastClr="FFFFFF"/>
+    </a:lt1>
+    <a:dk2>
+      <a:srgbClr val="5E5E5E"/>
+    </a:dk2>
+    <a:lt2>
+      <a:srgbClr val="DDDDDD"/>
+    </a:lt2>
+    <a:accent1>
+      <a:srgbClr val="418AB3"/>
+    </a:accent1>
+    <a:accent2>
+      <a:srgbClr val="A6B727"/>
+    </a:accent2>
+    <a:accent3>
+      <a:srgbClr val="F69200"/>
+    </a:accent3>
+    <a:accent4>
+      <a:srgbClr val="838383"/>
+    </a:accent4>
+    <a:accent5>
+      <a:srgbClr val="FEC306"/>
+    </a:accent5>
+    <a:accent6>
+      <a:srgbClr val="DF5327"/>
+    </a:accent6>
+    <a:hlink>
+      <a:srgbClr val="F59E00"/>
+    </a:hlink>
+    <a:folHlink>
+      <a:srgbClr val="B2B2B2"/>
+    </a:folHlink>
+  </a:clrScheme>
+</a:themeOverride>
+</file>
+
 <file path=ppt/theme/themeOverride2.xml><?xml version="1.0" encoding="utf-8"?>
 <a:themeOverride xmlns:a="http://schemas.openxmlformats.org/drawingml/2006/main">
   <a:clrScheme name="Marquee">
@@ -11456,12 +12175,12 @@
 </file>
 
 <file path=customXml/item1.xml><?xml version="1.0" encoding="utf-8"?>
-<p:properties xmlns:p="http://schemas.microsoft.com/office/2006/metadata/properties" xmlns:xsi="http://www.w3.org/2001/XMLSchema-instance" xmlns:pc="http://schemas.microsoft.com/office/infopath/2007/PartnerControls">
-  <documentManagement>
-    <Status xmlns="71af3243-3dd4-4a8d-8c0d-dd76da1f02a5">Not started</Status>
-    <MediaServiceKeyPoints xmlns="71af3243-3dd4-4a8d-8c0d-dd76da1f02a5" xsi:nil="true"/>
-  </documentManagement>
-</p:properties>
+<?mso-contentType ?>
+<FormTemplates xmlns="http://schemas.microsoft.com/sharepoint/v3/contenttype/forms">
+  <Display>DocumentLibraryForm</Display>
+  <Edit>DocumentLibraryForm</Edit>
+  <New>DocumentLibraryForm</New>
+</FormTemplates>
 </file>
 
 <file path=customXml/item2.xml><?xml version="1.0" encoding="utf-8"?>
@@ -11686,20 +12405,18 @@
 </file>
 
 <file path=customXml/item3.xml><?xml version="1.0" encoding="utf-8"?>
-<?mso-contentType ?>
-<FormTemplates xmlns="http://schemas.microsoft.com/sharepoint/v3/contenttype/forms">
-  <Display>DocumentLibraryForm</Display>
-  <Edit>DocumentLibraryForm</Edit>
-  <New>DocumentLibraryForm</New>
-</FormTemplates>
+<p:properties xmlns:p="http://schemas.microsoft.com/office/2006/metadata/properties" xmlns:xsi="http://www.w3.org/2001/XMLSchema-instance" xmlns:pc="http://schemas.microsoft.com/office/infopath/2007/PartnerControls">
+  <documentManagement>
+    <Status xmlns="71af3243-3dd4-4a8d-8c0d-dd76da1f02a5">Not started</Status>
+    <MediaServiceKeyPoints xmlns="71af3243-3dd4-4a8d-8c0d-dd76da1f02a5" xsi:nil="true"/>
+  </documentManagement>
+</p:properties>
 </file>
 
 <file path=customXml/itemProps1.xml><?xml version="1.0" encoding="utf-8"?>
-<ds:datastoreItem xmlns:ds="http://schemas.openxmlformats.org/officeDocument/2006/customXml" ds:itemID="{52F3B215-496E-4790-A364-7C1C46DEC771}">
+<ds:datastoreItem xmlns:ds="http://schemas.openxmlformats.org/officeDocument/2006/customXml" ds:itemID="{AE2713E1-6312-427E-BFCB-C5A5DA301373}">
   <ds:schemaRefs>
-    <ds:schemaRef ds:uri="http://schemas.microsoft.com/office/2006/metadata/properties"/>
-    <ds:schemaRef ds:uri="http://schemas.microsoft.com/office/infopath/2007/PartnerControls"/>
-    <ds:schemaRef ds:uri="71af3243-3dd4-4a8d-8c0d-dd76da1f02a5"/>
+    <ds:schemaRef ds:uri="http://schemas.microsoft.com/sharepoint/v3/contenttype/forms"/>
   </ds:schemaRefs>
 </ds:datastoreItem>
 </file>
@@ -11724,9 +12441,11 @@
 </file>
 
 <file path=customXml/itemProps3.xml><?xml version="1.0" encoding="utf-8"?>
-<ds:datastoreItem xmlns:ds="http://schemas.openxmlformats.org/officeDocument/2006/customXml" ds:itemID="{AE2713E1-6312-427E-BFCB-C5A5DA301373}">
+<ds:datastoreItem xmlns:ds="http://schemas.openxmlformats.org/officeDocument/2006/customXml" ds:itemID="{52F3B215-496E-4790-A364-7C1C46DEC771}">
   <ds:schemaRefs>
-    <ds:schemaRef ds:uri="http://schemas.microsoft.com/sharepoint/v3/contenttype/forms"/>
+    <ds:schemaRef ds:uri="http://schemas.microsoft.com/office/2006/metadata/properties"/>
+    <ds:schemaRef ds:uri="http://schemas.microsoft.com/office/infopath/2007/PartnerControls"/>
+    <ds:schemaRef ds:uri="71af3243-3dd4-4a8d-8c0d-dd76da1f02a5"/>
   </ds:schemaRefs>
 </ds:datastoreItem>
 </file>
</xml_diff>

<commit_message>
complete last results slide
</commit_message>
<xml_diff>
--- a/Final Presentation/MECH417_Team4_FinalPresentation.pptx
+++ b/Final Presentation/MECH417_Team4_FinalPresentation.pptx
@@ -5056,60 +5056,335 @@
         </p:nvSpPr>
         <p:spPr>
           <a:xfrm>
-            <a:off x="1066800" y="2103120"/>
-            <a:ext cx="10058400" cy="3849624"/>
+            <a:off x="1066800" y="1711354"/>
+            <a:ext cx="10058400" cy="4504052"/>
           </a:xfrm>
         </p:spPr>
         <p:txBody>
           <a:bodyPr>
-            <a:normAutofit/>
+            <a:normAutofit fontScale="92500" lnSpcReduction="10000"/>
           </a:bodyPr>
           <a:lstStyle/>
           <a:p>
             <a:r>
-              <a:rPr lang="en-US" dirty="0">
-                <a:solidFill>
-                  <a:srgbClr val="FF0000"/>
-                </a:solidFill>
-              </a:rPr>
-              <a:t>Discuss final user manual outcome</a:t>
+              <a:rPr lang="en-US" dirty="0"/>
+              <a:t>User Manual </a:t>
             </a:r>
           </a:p>
           <a:p>
             <a:pPr lvl="1"/>
             <a:r>
-              <a:rPr lang="en-US" dirty="0">
-                <a:solidFill>
-                  <a:srgbClr val="FF0000"/>
-                </a:solidFill>
-              </a:rPr>
-              <a:t>List section: introduction, GUI section, function, etc.</a:t>
+              <a:rPr lang="en-US" dirty="0"/>
+              <a:t>Introduction includes</a:t>
+            </a:r>
+          </a:p>
+          <a:p>
+            <a:pPr lvl="2"/>
+            <a:r>
+              <a:rPr lang="en-US" dirty="0"/>
+              <a:t>Purpose</a:t>
+            </a:r>
+          </a:p>
+          <a:p>
+            <a:pPr lvl="2"/>
+            <a:r>
+              <a:rPr lang="en-US" dirty="0"/>
+              <a:t>Conventions</a:t>
+            </a:r>
+          </a:p>
+          <a:p>
+            <a:pPr lvl="2"/>
+            <a:r>
+              <a:rPr lang="en-US" dirty="0"/>
+              <a:t>Audience</a:t>
+            </a:r>
+          </a:p>
+          <a:p>
+            <a:pPr lvl="2"/>
+            <a:r>
+              <a:rPr lang="en-US" dirty="0"/>
+              <a:t>Scope</a:t>
             </a:r>
           </a:p>
           <a:p>
             <a:pPr lvl="1"/>
             <a:r>
-              <a:rPr lang="en-US" dirty="0">
-                <a:solidFill>
-                  <a:srgbClr val="FF0000"/>
-                </a:solidFill>
-              </a:rPr>
-              <a:t>For each section: describe what is covered in each section</a:t>
+              <a:rPr lang="en-US" dirty="0"/>
+              <a:t>Description includes</a:t>
             </a:r>
           </a:p>
           <a:p>
             <a:pPr lvl="2"/>
             <a:r>
-              <a:rPr lang="en-US" dirty="0">
-                <a:solidFill>
-                  <a:srgbClr val="FF0000"/>
-                </a:solidFill>
-              </a:rPr>
-              <a:t>Ex. GUI section: covers installation and features of the GUI on the user side</a:t>
+              <a:rPr lang="en-US" dirty="0"/>
+              <a:t>Perspective</a:t>
+            </a:r>
+          </a:p>
+          <a:p>
+            <a:pPr lvl="2"/>
+            <a:r>
+              <a:rPr lang="en-US" dirty="0"/>
+              <a:t>Function</a:t>
+            </a:r>
+          </a:p>
+          <a:p>
+            <a:pPr lvl="2"/>
+            <a:r>
+              <a:rPr lang="en-US" dirty="0"/>
+              <a:t>User classes and characteristics</a:t>
+            </a:r>
+          </a:p>
+          <a:p>
+            <a:pPr lvl="2"/>
+            <a:r>
+              <a:rPr lang="en-US" dirty="0"/>
+              <a:t>Operating environment</a:t>
+            </a:r>
+          </a:p>
+          <a:p>
+            <a:pPr lvl="2"/>
+            <a:r>
+              <a:rPr lang="en-US" dirty="0"/>
+              <a:t>Constraints</a:t>
+            </a:r>
+          </a:p>
+          <a:p>
+            <a:pPr lvl="2"/>
+            <a:r>
+              <a:rPr lang="en-US" dirty="0"/>
+              <a:t>Assumptions and dependencies</a:t>
+            </a:r>
+          </a:p>
+          <a:p>
+            <a:pPr lvl="1"/>
+            <a:r>
+              <a:rPr lang="en-US" dirty="0"/>
+              <a:t>GUI User Guide includes</a:t>
+            </a:r>
+          </a:p>
+          <a:p>
+            <a:pPr lvl="2"/>
+            <a:r>
+              <a:rPr lang="en-US" dirty="0"/>
+              <a:t>Installation</a:t>
+            </a:r>
+          </a:p>
+          <a:p>
+            <a:pPr lvl="2"/>
+            <a:r>
+              <a:rPr lang="en-US" dirty="0"/>
+              <a:t>Opening the applet</a:t>
+            </a:r>
+          </a:p>
+          <a:p>
+            <a:pPr lvl="2"/>
+            <a:r>
+              <a:rPr lang="en-US" dirty="0"/>
+              <a:t>Using the applet</a:t>
+            </a:r>
+          </a:p>
+          <a:p>
+            <a:pPr lvl="1"/>
+            <a:r>
+              <a:rPr lang="en-US" dirty="0"/>
+              <a:t>System Functions includes</a:t>
+            </a:r>
+          </a:p>
+          <a:p>
+            <a:pPr lvl="2"/>
+            <a:r>
+              <a:rPr lang="en-US" dirty="0"/>
+              <a:t>Theory and Description for each function</a:t>
+            </a:r>
+          </a:p>
+          <a:p>
+            <a:pPr lvl="2"/>
+            <a:r>
+              <a:rPr lang="en-US" dirty="0"/>
+              <a:t>Fault Isolation for each function</a:t>
+            </a:r>
+          </a:p>
+          <a:p>
+            <a:pPr lvl="2"/>
+            <a:r>
+              <a:rPr lang="en-US" dirty="0"/>
+              <a:t>Links to related functions</a:t>
             </a:r>
           </a:p>
         </p:txBody>
       </p:sp>
+      <p:grpSp>
+        <p:nvGrpSpPr>
+          <p:cNvPr id="11" name="Group 10">
+            <a:extLst>
+              <a:ext uri="{FF2B5EF4-FFF2-40B4-BE49-F238E27FC236}">
+                <a16:creationId xmlns:a16="http://schemas.microsoft.com/office/drawing/2014/main" id="{2B9D2E86-B329-4DBA-B2AD-BA0CCB9A026C}"/>
+              </a:ext>
+            </a:extLst>
+          </p:cNvPr>
+          <p:cNvGrpSpPr/>
+          <p:nvPr/>
+        </p:nvGrpSpPr>
+        <p:grpSpPr>
+          <a:xfrm>
+            <a:off x="6589776" y="568994"/>
+            <a:ext cx="3718560" cy="2284719"/>
+            <a:chOff x="5565141" y="574047"/>
+            <a:chExt cx="3718560" cy="2284719"/>
+          </a:xfrm>
+        </p:grpSpPr>
+        <p:pic>
+          <p:nvPicPr>
+            <p:cNvPr id="6" name="Picture 5">
+              <a:extLst>
+                <a:ext uri="{FF2B5EF4-FFF2-40B4-BE49-F238E27FC236}">
+                  <a16:creationId xmlns:a16="http://schemas.microsoft.com/office/drawing/2014/main" id="{5129AC60-273A-4F78-B931-A9B5206429B3}"/>
+                </a:ext>
+              </a:extLst>
+            </p:cNvPr>
+            <p:cNvPicPr>
+              <a:picLocks noChangeAspect="1"/>
+            </p:cNvPicPr>
+            <p:nvPr/>
+          </p:nvPicPr>
+          <p:blipFill>
+            <a:blip r:embed="rId4"/>
+            <a:stretch>
+              <a:fillRect/>
+            </a:stretch>
+          </p:blipFill>
+          <p:spPr>
+            <a:xfrm>
+              <a:off x="5565141" y="574047"/>
+              <a:ext cx="3718560" cy="2051861"/>
+            </a:xfrm>
+            <a:prstGeom prst="rect">
+              <a:avLst/>
+            </a:prstGeom>
+          </p:spPr>
+        </p:pic>
+        <p:sp>
+          <p:nvSpPr>
+            <p:cNvPr id="9" name="TextBox 8">
+              <a:extLst>
+                <a:ext uri="{FF2B5EF4-FFF2-40B4-BE49-F238E27FC236}">
+                  <a16:creationId xmlns:a16="http://schemas.microsoft.com/office/drawing/2014/main" id="{60DA80BB-19AF-4DBA-9630-E37132FE09BF}"/>
+                </a:ext>
+              </a:extLst>
+            </p:cNvPr>
+            <p:cNvSpPr txBox="1"/>
+            <p:nvPr/>
+          </p:nvSpPr>
+          <p:spPr>
+            <a:xfrm>
+              <a:off x="6216398" y="2612545"/>
+              <a:ext cx="2416046" cy="246221"/>
+            </a:xfrm>
+            <a:prstGeom prst="rect">
+              <a:avLst/>
+            </a:prstGeom>
+            <a:noFill/>
+          </p:spPr>
+          <p:txBody>
+            <a:bodyPr wrap="none" rtlCol="0">
+              <a:spAutoFit/>
+            </a:bodyPr>
+            <a:lstStyle/>
+            <a:p>
+              <a:r>
+                <a:rPr lang="en-US" sz="1000" dirty="0"/>
+                <a:t>Example of System Function Section</a:t>
+              </a:r>
+            </a:p>
+          </p:txBody>
+        </p:sp>
+      </p:grpSp>
+      <p:grpSp>
+        <p:nvGrpSpPr>
+          <p:cNvPr id="10" name="Group 9">
+            <a:extLst>
+              <a:ext uri="{FF2B5EF4-FFF2-40B4-BE49-F238E27FC236}">
+                <a16:creationId xmlns:a16="http://schemas.microsoft.com/office/drawing/2014/main" id="{79B88FC2-9F4B-4382-BDF7-327A30273B2F}"/>
+              </a:ext>
+            </a:extLst>
+          </p:cNvPr>
+          <p:cNvGrpSpPr/>
+          <p:nvPr/>
+        </p:nvGrpSpPr>
+        <p:grpSpPr>
+          <a:xfrm>
+            <a:off x="6840120" y="2927698"/>
+            <a:ext cx="3217872" cy="3509638"/>
+            <a:chOff x="8331408" y="2914318"/>
+            <a:chExt cx="3217872" cy="3509638"/>
+          </a:xfrm>
+        </p:grpSpPr>
+        <p:pic>
+          <p:nvPicPr>
+            <p:cNvPr id="8" name="Picture 7">
+              <a:extLst>
+                <a:ext uri="{FF2B5EF4-FFF2-40B4-BE49-F238E27FC236}">
+                  <a16:creationId xmlns:a16="http://schemas.microsoft.com/office/drawing/2014/main" id="{0930CE1A-BBDD-4832-A9D8-A0C2BA9E1A22}"/>
+                </a:ext>
+              </a:extLst>
+            </p:cNvPr>
+            <p:cNvPicPr>
+              <a:picLocks noChangeAspect="1"/>
+            </p:cNvPicPr>
+            <p:nvPr/>
+          </p:nvPicPr>
+          <p:blipFill>
+            <a:blip r:embed="rId5"/>
+            <a:stretch>
+              <a:fillRect/>
+            </a:stretch>
+          </p:blipFill>
+          <p:spPr>
+            <a:xfrm>
+              <a:off x="8331408" y="2914318"/>
+              <a:ext cx="3217872" cy="3271904"/>
+            </a:xfrm>
+            <a:prstGeom prst="rect">
+              <a:avLst/>
+            </a:prstGeom>
+          </p:spPr>
+        </p:pic>
+        <p:sp>
+          <p:nvSpPr>
+            <p:cNvPr id="13" name="TextBox 12">
+              <a:extLst>
+                <a:ext uri="{FF2B5EF4-FFF2-40B4-BE49-F238E27FC236}">
+                  <a16:creationId xmlns:a16="http://schemas.microsoft.com/office/drawing/2014/main" id="{0DEFA462-B082-43B6-B046-D11767B24591}"/>
+                </a:ext>
+              </a:extLst>
+            </p:cNvPr>
+            <p:cNvSpPr txBox="1"/>
+            <p:nvPr/>
+          </p:nvSpPr>
+          <p:spPr>
+            <a:xfrm>
+              <a:off x="8868158" y="6177735"/>
+              <a:ext cx="2339102" cy="246221"/>
+            </a:xfrm>
+            <a:prstGeom prst="rect">
+              <a:avLst/>
+            </a:prstGeom>
+            <a:noFill/>
+          </p:spPr>
+          <p:txBody>
+            <a:bodyPr wrap="none" rtlCol="0">
+              <a:spAutoFit/>
+            </a:bodyPr>
+            <a:lstStyle/>
+            <a:p>
+              <a:r>
+                <a:rPr lang="en-US" sz="1000" dirty="0"/>
+                <a:t>Example of GUI User Guide Section</a:t>
+              </a:r>
+            </a:p>
+          </p:txBody>
+        </p:sp>
+      </p:grpSp>
     </p:spTree>
     <p:extLst>
       <p:ext uri="{BB962C8B-B14F-4D97-AF65-F5344CB8AC3E}">
@@ -12166,12 +12441,12 @@
 </file>
 
 <file path=customXml/item1.xml><?xml version="1.0" encoding="utf-8"?>
-<p:properties xmlns:p="http://schemas.microsoft.com/office/2006/metadata/properties" xmlns:xsi="http://www.w3.org/2001/XMLSchema-instance" xmlns:pc="http://schemas.microsoft.com/office/infopath/2007/PartnerControls">
-  <documentManagement>
-    <Status xmlns="71af3243-3dd4-4a8d-8c0d-dd76da1f02a5">Not started</Status>
-    <MediaServiceKeyPoints xmlns="71af3243-3dd4-4a8d-8c0d-dd76da1f02a5" xsi:nil="true"/>
-  </documentManagement>
-</p:properties>
+<?mso-contentType ?>
+<FormTemplates xmlns="http://schemas.microsoft.com/sharepoint/v3/contenttype/forms">
+  <Display>DocumentLibraryForm</Display>
+  <Edit>DocumentLibraryForm</Edit>
+  <New>DocumentLibraryForm</New>
+</FormTemplates>
 </file>
 
 <file path=customXml/item2.xml><?xml version="1.0" encoding="utf-8"?>
@@ -12396,20 +12671,18 @@
 </file>
 
 <file path=customXml/item3.xml><?xml version="1.0" encoding="utf-8"?>
-<?mso-contentType ?>
-<FormTemplates xmlns="http://schemas.microsoft.com/sharepoint/v3/contenttype/forms">
-  <Display>DocumentLibraryForm</Display>
-  <Edit>DocumentLibraryForm</Edit>
-  <New>DocumentLibraryForm</New>
-</FormTemplates>
+<p:properties xmlns:p="http://schemas.microsoft.com/office/2006/metadata/properties" xmlns:xsi="http://www.w3.org/2001/XMLSchema-instance" xmlns:pc="http://schemas.microsoft.com/office/infopath/2007/PartnerControls">
+  <documentManagement>
+    <Status xmlns="71af3243-3dd4-4a8d-8c0d-dd76da1f02a5">Not started</Status>
+    <MediaServiceKeyPoints xmlns="71af3243-3dd4-4a8d-8c0d-dd76da1f02a5" xsi:nil="true"/>
+  </documentManagement>
+</p:properties>
 </file>
 
 <file path=customXml/itemProps1.xml><?xml version="1.0" encoding="utf-8"?>
-<ds:datastoreItem xmlns:ds="http://schemas.openxmlformats.org/officeDocument/2006/customXml" ds:itemID="{52F3B215-496E-4790-A364-7C1C46DEC771}">
+<ds:datastoreItem xmlns:ds="http://schemas.openxmlformats.org/officeDocument/2006/customXml" ds:itemID="{AE2713E1-6312-427E-BFCB-C5A5DA301373}">
   <ds:schemaRefs>
-    <ds:schemaRef ds:uri="http://schemas.microsoft.com/office/2006/metadata/properties"/>
-    <ds:schemaRef ds:uri="http://schemas.microsoft.com/office/infopath/2007/PartnerControls"/>
-    <ds:schemaRef ds:uri="71af3243-3dd4-4a8d-8c0d-dd76da1f02a5"/>
+    <ds:schemaRef ds:uri="http://schemas.microsoft.com/sharepoint/v3/contenttype/forms"/>
   </ds:schemaRefs>
 </ds:datastoreItem>
 </file>
@@ -12434,9 +12707,11 @@
 </file>
 
 <file path=customXml/itemProps3.xml><?xml version="1.0" encoding="utf-8"?>
-<ds:datastoreItem xmlns:ds="http://schemas.openxmlformats.org/officeDocument/2006/customXml" ds:itemID="{AE2713E1-6312-427E-BFCB-C5A5DA301373}">
+<ds:datastoreItem xmlns:ds="http://schemas.openxmlformats.org/officeDocument/2006/customXml" ds:itemID="{52F3B215-496E-4790-A364-7C1C46DEC771}">
   <ds:schemaRefs>
-    <ds:schemaRef ds:uri="http://schemas.microsoft.com/sharepoint/v3/contenttype/forms"/>
+    <ds:schemaRef ds:uri="http://schemas.microsoft.com/office/2006/metadata/properties"/>
+    <ds:schemaRef ds:uri="http://schemas.microsoft.com/office/infopath/2007/PartnerControls"/>
+    <ds:schemaRef ds:uri="71af3243-3dd4-4a8d-8c0d-dd76da1f02a5"/>
   </ds:schemaRefs>
 </ds:datastoreItem>
 </file>
</xml_diff>